<commit_message>
Update score lab 2 OOP
</commit_message>
<xml_diff>
--- a/SE334-Programming Paradigms/Slides/1. Haskell.pptx
+++ b/SE334-Programming Paradigms/Slides/1. Haskell.pptx
@@ -130,158 +130,6 @@
 </p:presentation>
 </file>
 
-<file path=ppt/ink/ink1.xml><?xml version="1.0" encoding="utf-8"?>
-<inkml:ink xmlns:inkml="http://www.w3.org/2003/InkML">
-  <inkml:definitions>
-    <inkml:context xml:id="ctx0">
-      <inkml:inkSource xml:id="inkSrc0">
-        <inkml:traceFormat>
-          <inkml:channel name="X" type="integer" max="1366" units="cm"/>
-          <inkml:channel name="Y" type="integer" max="768" units="cm"/>
-          <inkml:channel name="T" type="integer" max="2.14748E9" units="dev"/>
-        </inkml:traceFormat>
-        <inkml:channelProperties>
-          <inkml:channelProperty channel="X" name="resolution" value="39.7093" units="1/cm"/>
-          <inkml:channelProperty channel="Y" name="resolution" value="39.58763" units="1/cm"/>
-          <inkml:channelProperty channel="T" name="resolution" value="1" units="1/dev"/>
-        </inkml:channelProperties>
-      </inkml:inkSource>
-      <inkml:timestamp xml:id="ts0" timeString="2022-03-10T14:53:13.646"/>
-    </inkml:context>
-    <inkml:brush xml:id="br0">
-      <inkml:brushProperty name="width" value="0.05292" units="cm"/>
-      <inkml:brushProperty name="height" value="0.05292" units="cm"/>
-      <inkml:brushProperty name="color" value="#FF0000"/>
-    </inkml:brush>
-  </inkml:definitions>
-  <inkml:trace contextRef="#ctx0" brushRef="#br0">5581 9550 0,'25'0'79,"0"49"-64,24 26-15,-24-50 16,0-1-16,0 26 15,24 24-15,-24-49 16,0 25 0,0-1-16,0 1 15,-1-25-15,26 25 16,-25-26 0,49 26-16,-24-50 0,-25 25 15,-1-25 1,1 0-16,0 0 125</inkml:trace>
-  <inkml:trace contextRef="#ctx0" brushRef="#br0" timeOffset="2066.51">5457 9823 0,'0'-25'141,"0"0"-141,25-25 16,-25 26-1,0-1-15,0 0 16,0-25-16,25 1 16,-25-1-1,24 25-15,-24 1 16,25-1-1,-25 0-15,0 0 16,25 25 187,25 25-187,-26-25-1,1 25 1,0 0 0,0-25-16,0 0 15,-25 24-15,24-24 16,1 0 0,0 25-16,0-25 15,0 0 1,0 0-1,-1 0 1,1 0-16,0 25 16,0-25-1</inkml:trace>
-  <inkml:trace contextRef="#ctx0" brushRef="#br0" timeOffset="3882.15">7342 10269 0,'25'25'125,"0"0"-109,0 0-1,-1-25-15,-24 24 16,25-24-16,0 25 15,-25 0-15,25 0 16,0-25-16,-1 49 16,1-49-16,-25 25 15,25-25-15,-25 25 16,25-25 0,0 0-16,-25 25 15,24-25-15,1 0 16,-25 25-1</inkml:trace>
-  <inkml:trace contextRef="#ctx0" brushRef="#br0" timeOffset="4814.51">7789 10145 0,'-25'-25'16,"0"25"15,25 25-31,-25-25 16,25 25-16,-49 0 15,49 0-15,-25-1 16,0-24-16,-25 50 16,26-25-16,-1 0 15,0 24-15,0-24 16,0 0-16,1 0 15,-1-1 1,25 1-16</inkml:trace>
-  <inkml:trace contextRef="#ctx0" brushRef="#br0" timeOffset="6630.58">8111 10220 0,'-25'0'141,"1"0"-126,-51 0-15,50 0 16,-24 0 0,24 24-16,25 1 109,0 0-46,0 0-48,0 0-15,25-25 16,-1 0-1,1 0-15,0 0 16,0 0-16,0 0 16,0 0-1,-1 0 1,1 0 0,0 0-1,0 24 32,0-24-16,-25 25-15,24 0 15,-24 0-31,25 0 16,0 24-1,-25 1-15,0-25 16,0-1-16,0 1 16,0 0-16,0 0 15,0 0 1,-25-25-16,25 24 16,-25-24-1,-24 25-15,24-25 31,0 0-15,0 0-16,1 0 31,-1 0 16,0 0 0,0 0 31,0 0-47</inkml:trace>
-  <inkml:trace contextRef="#ctx0" brushRef="#br0" timeOffset="13441.03">5011 7937 0,'0'25'63,"0"25"-63,0 0 15,0-26 1,0 26-16,0-25 31,-25-25 78,25-25-93,0 0 0,0 0-16,0-49 15,0 49-15,0-25 16,0 26-16,0-1 0,0 0 16,0 0-1,25 25 48,-1 0-48,1 0-15,0 50 16,-25-25-16,25-1 16,-25 1-16,49 50 15,-49-50 1,0-1-1,0 1 1,25 0 47,0-25-1,0 0-62,0-25 16,-1 0 15,-24 1-31,25-26 0,-25 25 16,0 0-1,0 0-15,0 1 16,0-1-1,-25 25 95,25 25-95,0-1-15,0 1 16,0 0-16,0 0 16,0 0-16,0 0 15,0-1 1,0 1-16,0 0 31,25-25-31,0 25 16,0-25-1,0 0-15,-1 0 16,1 0 0,0 0-1,0 0-15,0 0 16,-1 0 0,-24-25-16,50-25 15,-50 26-15,25-1 16,-25-25-16,0 25 15,0 0 1,49 50 109,-49 75-125,25-76 16,-25 26-16,25-25 15,0 0-15,0-1 16,24 1 0,-24-74 62,0 24-63,-25-25-15,0 1 16,50-51 0,-50 51-16,24 24 0,-24 0 15,0 0-15,25 25 63,0 0-32,0 25-15,24 25-16,-24-26 15,-25 1 1,0 0-1,25-25 32,0-25-15,-25 0-1,0 1-31,0-1 15,25 0 1,-25 0 31</inkml:trace>
-  <inkml:trace contextRef="#ctx0" brushRef="#br0" timeOffset="18877">5655 10691 0,'25'0'31,"0"25"1,-25-1-32,0 1 15,0 0 1,0 0-1,0 0 1,0-1 0,0-73 171,0-1-171,25 1-16,0 24 15,-1-25 1,1 25 0,0 25-1,-25-24 32,25 24-31,0 0-1,0 0 1,-1 24 0,1 1-1,-25 0-15,25-25 16,-25 25-16,0 0 16,0-1-1,50 1 1,-50 0-16,0 0 0,24 0 15,-24-1-15,25-24 16,-25 25-16,25-25 16,-25 25-16,25-25 31,0 0 16,-1 0-16,1 0-31,0 0 16,0-25-16,24 0 15,-24-24 1,0 24-16,0 0 16,-25 0-16,25 1 15,-25-1-15,0 0 31,0 0 1,0 0-1,-25 25 0,0 0 0,0 0-15,0 0 0,25 25-1,0 0 1,0 0-16,0 0 31,0-1-31,0 1 16,0 25-1,25-50 1,0 25 0,0-25-1,0 0 1,-1 0 0,26 0-1,-25 0 1,0 0-1,-1-25 1,26 0 0,-50 0-1,25 25-15,-25-25 16,0 1-16,0-1 16,0 0-16,0 0 15,0 0-15,0 1 16,0-1-1,25 25 48,-1 0-47,1 25-1,0-1-15,25 51 16,-26-50-1,26 24 1,-50-24 0,25 0-16,0 0 15,0-1 17,-1-24 14,-24-24 17,25-26-47,-25 25-16,0 0 15,0 1 1,0-1-16,0 0 47,0 0-16,0 0-31,25 25 125,0 0-125,0 25 16,-1 0-16,1 0 15,0 0-15,0-25 16,-25 24-16,25-24 156,-25-49-93,0-1-48,24 25 1,-24-24-16,0 24 15,0 0-15</inkml:trace>
-  <inkml:trace contextRef="#ctx0" brushRef="#br0" timeOffset="24118.69">9079 10740 0,'24'-24'157,"1"24"-142,-25 24 1,25 1-16,0-25 16,0 50-16,-1-50 15,26 25-15,0 24 16,-1-24-1,-24 0 17,49-25-17,-24 0-15,-25 0 0,0 25 16,24-25 0,1 0-16,-1 0 0,1 0 15,0 0 1,-26 0-16,26 0 15,0 0-15,-1 0 16,-24 0-16,0 0 16</inkml:trace>
-  <inkml:trace contextRef="#ctx0" brushRef="#br0" timeOffset="24809.52">10021 10716 0,'25'24'15,"0"1"-15,0 50 16,-1-75-16,1 49 16,0-49-1,0 25 1,0-25-1,-1 0-15,-24 25 94,0 24-78,0-24-16,-49 50 15,-1-1-15,1-24 16,-26 49-16,50-49 16,-24 49-1,24-74-15,-25-1 16,25 26-16</inkml:trace>
-  <inkml:trace contextRef="#ctx0" brushRef="#br0" timeOffset="26386.2">15999 7913 0,'25'0'31,"0"0"16,-1 0-47,1-50 16,0 25-1,25-24-15,24-26 16,-49 26-16,24-1 16,-24 25-16,0 0 15,0-24-15,0 49 16,-25 25 93,0 24-93,0 26-1,0-26-15,0 1 16,0 24-16,0-24 16,0-25-16,0-1 15,0 26-15,0-25 0,0 0 16,0 0 0,25-25-16,-25 24 15,0 1 1</inkml:trace>
-  <inkml:trace contextRef="#ctx0" brushRef="#br0" timeOffset="27667.74">12179 7714 0,'-25'0'0,"0"0"32,1 0-17,-1 25 1,0-25-1,0 0 1,0 25-16,1-25 31,24-25 63,24 25-16,1 25-78,0-25 16,-25 25-16,25-1 15,-25 51 1,0-50 0,0 49-1,-25-24 1,-74 49-16,74-74 0,-74 49 16,24-24-16,1 24 15,24-74-15,1 50 16,24-50-1,0 0 32,25-25-31,0-25-16,25 26 16,25-26-16,-1 25 15,1-24-15,-1 49 16,1 0-16,-25-25 15,0 25-15,-1 0 16,1 0-16,50 25 16,-51-1-16,26 26 31,-25-50-15,-25 25-16,25-25 15</inkml:trace>
-  <inkml:trace contextRef="#ctx0" brushRef="#br0" timeOffset="28790">8855 7838 0,'25'0'15,"0"0"1,0 0-1,-1 0 1,26 0-16,-25 0 16,0 0-16,0 25 15,-1 0 1,1 0-16,-25-1 31,0 1-15,0 0-16,0 0 15,0 25-15,0-1 16,-25 1-16,-24-1 16,-1-24-16,-24 25 15,24-1-15,25-24 16,0-25-16,1 0 16,48 0 77,26 0-77,-25 0-16,24 0 0,1 0 16,-25 0-16,0 0 15,0 0 1,-25 25 31,0 0-32,0 0 1,0-1 0,0 1-16,-25-25 15,0 0-15,0 0 16,0 0-16,0 0 15,1 0 1,-1 0-16,0 0 16,0 0-1</inkml:trace>
-  <inkml:trace contextRef="#ctx0" brushRef="#br0" timeOffset="30540.56">11807 11162 0,'-25'0'16,"0"0"-16,1 0 15,-1 0-15,0-50 16,0 26-16,-24-1 16,49 0-1,-25 0 16,0 25-31,-25 0 16,26 0 0,-1 0-16,0 25 0,0 25 15,25-26 1,0 26 0,0-25-16,0 0 15,0 0-15,0-1 16,25-24 31,25 0-32,-26-24 1,1-1-16,25-25 16,-25 0-16,-25 1 15,24 24-15,1-49 16,-25-1-16,25 26 15,-25-1-15,0 0 16,0 1 0,0-1-16,0 25 15,0 1-15,0-1 16,0 74 62,0 1-78,0 24 16,25 1-16,-25 49 15,25-99-15,-25 24 16,0-24-16,24-25 16,-24 25-16,25-25 62,0 0-62,0-25 16,0 0-16,-1 25 15</inkml:trace>
-  <inkml:trace contextRef="#ctx0" brushRef="#br0" timeOffset="31574.16">12005 10815 0,'-24'0'15,"-26"0"1,50 74 0,0-24-16,0-1 15,0-24-15,0 0 16,0 0-16,0 0 16,25-25 15,24 0-31,1 0 15,-25 0-15,0-25 16,-1-25-16,1 1 16,25-26-16,-25 26 15,-25 24-15,0 0 16,25 0-16,-25 75 78,0-1-62,0-24-1,0 0-15,0 0 16,0 0 0,24-25-16,1 0 15,0 0-15,0 0 16,0 0-1,-1 0 1,26-50-16,0 0 16,-26 26-16,1-1 15,0 25 32,0 0-16,-25 25-31,25 24 16,-1-49 0,1 0 31,0 0-32,0 0-15,-25-25 16,25 1-16,-1-1 15,-24 0-15,50 25 63,-50 25-32,0 24 16,25-49 0,0-24-31</inkml:trace>
-  <inkml:trace contextRef="#ctx0" brushRef="#br0" timeOffset="31950.42">12849 10220 0,'0'24'0,"0"76"16,0-51-16,0 1 0,25 49 15,-25-74 1,24 74-16,-24-49 16,25 74-16,0-50 15,-25 0-15,25-24 16,0 0-16,-25-26 15,0 1-15</inkml:trace>
-  <inkml:trace contextRef="#ctx0" brushRef="#br0" timeOffset="32379.5">13097 10616 0,'0'-24'16,"25"24"-1,-1 24 1,1 1 0,-25 0 15,0 25-31,0-26 0,0 1 15,0 50-15,0-26 16,0-24 15</inkml:trace>
-  <inkml:trace contextRef="#ctx0" brushRef="#br0" timeOffset="33782.06">13494 10294 0,'0'50'16,"0"-26"-16,0 51 15,0-1-15,0 25 16,0 25-16,25-49 16,-25 24-16,24-49 15,1-26-15,-25-98 78,0-25-62,0 24-16,0 26 16,0-26-16,0-24 15,0 0 1,0 25-16,25 49 15,0 0-15,0 25 47,24 25-31,-49 74-16,25-49 16,49 24-16,-49 0 15,0-24-15,0-25 16,24 24-16,-49-24 15,25-25 17,0 0-1,-25-25-31,50-74 0,-50 74 16,49-74-1,-49 74-15,0 1 0,0-1 16,25 25 62,-25 49-62,50 51-16,-50-51 15,24 50-15,1-49 16,0 49-16,0-74 15,24 49-15,-24-24 16,0-25-16,0-25 31,0 0-15,-25-25 0,0-25-1,25 26-15,-1-26 16,-24 0-16,0 1 15,0-50-15,0 74 0,0 0 16,0 0 0,0 0-1,-49 25 32,49 25-31,0 25-1,0 24-15,0-49 16,0 49-16,0-49 16,0 0-1,0 0-15,25-25 47,-1 0-47,1 0 16,50 0-1,-51 0-15,51 0 16,-1-25-16,25 0 16,25 0-16,-74 1 15</inkml:trace>
-  <inkml:trace contextRef="#ctx0" brushRef="#br0" timeOffset="34406.21">15180 10071 0,'-24'0'63,"-26"25"-63,25 24 16,25 1-16,-25 24 15,25-24 1,-24 49-16,24-25 15,0 50-15,0-24 16,0-26-16,0 25 16,0-74-16,0 25 15,0-26-15,24 1 16,1-25-16,-25 25 16,25-25-1,0 0 48</inkml:trace>
-  <inkml:trace contextRef="#ctx0" brushRef="#br0" timeOffset="35363.81">15453 10468 0,'-24'0'156,"24"24"-140,24-48 78,1-76-79,-25 51 1,25-1-1,-25 25-15,50-24 16,-26 74 125,-24 24-141,0 26 15,25-26-15,0 50 16,-25-49 0,0 49-16,25-24 15,-25-26-15,25-24 16,-1 25-16,-24-1 15</inkml:trace>
-  <inkml:trace contextRef="#ctx0" brushRef="#br0" timeOffset="36082.72">15925 10021 0,'0'-25'63,"24"25"-48,1 25 1,0 0-16,0 25 16,24 24-16,-49-49 15,0 24-15,0 1 16,25-25-16,-25 24 16,0-24-16,0 0 15,0 25-15,0-26 16,0 51-16,0-26 15,0-24 1,0 50-16,0-51 0,-25 1 16,1 25-16,-1-25 15,25-1 1</inkml:trace>
-  <inkml:trace contextRef="#ctx0" brushRef="#br0" timeOffset="58744.16">16594 10319 0,'-24'0'47,"24"25"15,0-1-46,49-24-16,1 25 15,-25 0 1,-1-25 0,26 0-16,0 0 15,-1 0 1,26 0-16,-51 0 0,1 0 16,25 0-16,-1 0 15,1 0 1,0 0-16,-1 0 15,-24 0-15,25 0 16,-26-25-16,1 25 16,25 0-16,-25 0 15,24 0 1,-24 0-16,0 0 16,0 0-1,0 0 1,-1 0-16</inkml:trace>
-  <inkml:trace contextRef="#ctx0" brushRef="#br0" timeOffset="59428.13">17388 10046 0,'25'25'63,"-25"0"-48,25-25-15,24 24 16,1 26-16,-25-25 15,49 0-15,-24-1 16,-25-24-16,-1 25 16,1-25-16,0 0 15,-25 25 1,25-25 109,-25 50-109,0 49-16,-25-50 15,0 26-15,0-26 0,25 1 16,0-25-1,-24 0-15,24-1 16</inkml:trace>
-  <inkml:trace contextRef="#ctx0" brushRef="#br0" timeOffset="64861.55">18852 10344 0,'-25'0'47,"0"0"-31,-49-25-16,49 25 62,0 0-15,25 25 16,25-25-48,0 0 1,-1 0-1,1-25-15,-25 0 16,25-25-16,0-24 16,0 0-16,-25 24 15,24 0-15,-24-74 16,0 99-16,0-49 16,0 24-16,0-24 15,0 49-15,0 0 16,-24 1 31,24 73-16,0 1-15,0 49-16,0-25 15,0-24-15,0 0 16,0-1-16,49 26 15,-49-1-15,50-49 16,-50 0-16,25 24 16,-1-49-1,-24 25 1,25-25 15,0 0-15</inkml:trace>
-  <inkml:trace contextRef="#ctx0" brushRef="#br0" timeOffset="66081.2">19100 10096 0,'0'24'63,"0"1"-63,0 0 15,0 0-15,0 0 16,0-1-16,0 1 15,0 0 1,24-25 15,26 0 1,-25-25-17,-25 0 1,0-24-16,25-26 15,-25 51 1,0-1-16,0 0 16,24 50 93,-24 24-109,25 1 16,0-25-16,25 24 15,-26-24-15,26 25 16,-25-50 0,0 0 15,-1 0-16,1 0 1,-25-25-16,25 0 16,-25 0-1,0 1-15,0-1 16,0 0-16,0 0 16,0 0-16,0 1 15,0-1 48,25 25-48,-25 25-15,25 49 16,0-49 0,24 49-16,-24-49 15,-25 0 1,25-25 62,0 0-62,-25-25-16,0 0 15,0 0-15,24 1 16,-24-1-16,0 0 15,25 0 1</inkml:trace>
-  <inkml:trace contextRef="#ctx0" brushRef="#br0" timeOffset="67410.67">20092 9327 0,'0'74'15,"0"0"1,0-24-16,0 24 16,0-49-16,25 50 15,-1-1-15,1 50 16,0-25-16,-25 1 15,25-26-15,0 25 16,-25-49-16,0-1 16,0-24-1,0-74 79,-25-1-78,0 0-16,25 1 15,-25-50-15,25 49 0,0 0 16,0 1-16,0-1 31,25 25-31,0 25 16,0 0 15,-1 0-31,1 0 16,0 0-1,-25 25 17,0 25-17,0-1 1,0-24-16,0 0 15,0 0-15,-25 0 16,25-1 62,0 1-78,25-25 16,25 0-1,-26 0 1,1 0-16,0 0 16,0 0-16,0 0 15,-1 0-15,26-25 16,-25 1-16,24-51 16,-49 50-16,0 0 15,0 1-15,0-1 16,0 0-1,-49 50 79,24 24-94,25-24 16,-25 0-16,25 25 15,0-25-15,0 24 16,0-24 0,50 0-1,-25-25 17,-1 0-17,26 25 1,-25-25-16,25 0 15,-26 0-15,26 0 16,-25 0 0,24 0-16,-24 0 15</inkml:trace>
-  <inkml:trace contextRef="#ctx0" brushRef="#br0" timeOffset="69984">21282 9426 0,'0'25'31,"0"74"-31,0-50 16,0 51-16,0 24 16,0-25-16,25 25 15,-25-25-15,25 0 16,0-49-1,-25-25-15,0 0 16,0-125 93,-25 1-109,-25-50 16,26 0-16,-1-49 16,0 49-16,0 0 15,25 75-15,0 0 16,0 49 0,25 74 46,49 75-46,-49-99-16,25 25 15,24 49-15,1 25 16,-1 0-16,25 0 16,-24-74-16,-26 24 15,-24 1-15,0-150 78,0 25-78,-25-49 16,0 0-16,49-25 16,-49 50-16,25-1 15,-25-24 1,25 49-16,-25 26 15,25-26-15,-25 75 79,25 74-79,-25-25 15,24-24-15,1 24 16,25 50-16,-25-24 15,24 48-15,26-23 16,-26-26-16,1-50 16,-50-24-16,25 0 15,-1-25 48,1-50-32,-25 26-31,25-51 16,0 1-16,0 24 15,-25-24-15,0 49 16,0 0-16,0 0 16,0 0 62,-25 25-63,-25 0 1,1 75-16,49-26 16,-25 1-1,25-25-15,0 25 16,0-26-16,0 1 31,0 0 0,25 0 32,-1-25-63</inkml:trace>
-  <inkml:trace contextRef="#ctx0" brushRef="#br0" timeOffset="73172.14">23068 9401 0,'0'25'62,"0"49"-62,0 1 16,0-26 0,-24 26-16,-1 24 15,25 0-15,0-49 16,0 49-16,0-25 16,0 26-16,25-51 0,24 75 15,-24-74 1,0-25-1,0-1-15,-1-24 32,26 0-17,-25 0-15</inkml:trace>
-  <inkml:trace contextRef="#ctx0" brushRef="#br0" timeOffset="73791.97">23416 9897 0,'0'-50'47,"24"50"-31,51 0-16,-26 0 16,1 0-16,-25 0 15,0 0-15,-1 0 16,-24 50 31,0-25-47,0 24 15,0 26-15,-24-50 16,24 24-16,-50 26 0,50-26 16,-25-24-1,25 0-15,-25 0 16,25 0 31,50-25-32,-25 0 1,24 0-16,26 0 16,-26 0-1,1 0-15,25 0 16,-26 0-16,26-25 0,-26 25 15,-24-25-15,25 0 16,-26 0 0,1 1-1</inkml:trace>
-  <inkml:trace contextRef="#ctx0" brushRef="#br0" timeOffset="74273.75">23887 9277 0,'50'25'32,"-26"0"-32,26-1 15,-25 1-15,24 0 0,1 25 16,0 24 0,-26-24-16,1-1 15,25 1-15,-50-25 16,49 49-16,-49-24 15,25-1-15,-25 1 16,25-1-16,0 1 16,-25 25-16,0-51 15,0 26-15,0-25 16,0 0 0,0 24-16,0-24 15,-25 0-15,0 0 0</inkml:trace>
-  <inkml:trace contextRef="#ctx0" brushRef="#br0" timeOffset="74719.97">24829 9947 0,'25'0'31,"0"0"-15,25 0-16,49 0 15,-49 0-15,49-25 16,-50 25-16,26 0 16,24-25-16,-25 0 15,26 25-15,-76-25 16,1 25 0</inkml:trace>
-  <inkml:trace contextRef="#ctx0" brushRef="#br0" timeOffset="75386.46">25698 9699 0,'24'0'32,"-24"24"-32,25 1 0,0-25 15,0 25-15,24-25 16,-49 25-16,25 0 16,25-1-16,0 1 15,-26 0 1,-24 25 62,0-26-62,-24 26-16,-26 0 15,25-25-15,-25 74 16,26-74-16,-1-1 15,0 1-15,0-25 16</inkml:trace>
-  <inkml:trace contextRef="#ctx0" brushRef="#br0" timeOffset="77808.48">14263 12452 0,'-25'0'78,"-25"0"-31,25 0-47,-49 0 15,24 0-15,26 50 16,-26-50 0,25 24-16,-49 26 15,74-25-15,-25-25 16,25 25-16,-25-1 15,25 26 1,0-25 0,0 0-16,0-1 15,0 1-15,0 0 16,0 25-16,25-50 16,0 24-16,24 1 15,26 25-15,-26-50 16,51 0-16,-26 0 15,0 25-15,1-1 16,-25 1-16,24 0 16,-49-25-16,0 25 15,-1 0-15,26-1 16,-25 1-16,0 0 16,-1 0-16,-24 0 31,25 24-16,-25-24 1,0 25-16,-25-50 16,1 0-1,-26 0-15,25 0 16,0 0-16,1 0 16,-1 0-1,0 0-15,0 0 16,0 0-16,25-25 15,-24 0-15,-1-49 16,0 49-16,25 0 16,-25-49-16,25 24 15,-25-74 1,25 74-16,0-49 0,0 25 16,0 24-1,0 1-15,25-26 0,0 50 16,0 1-16,0-26 15,-1 50 32</inkml:trace>
-  <inkml:trace contextRef="#ctx0" brushRef="#br0" timeOffset="78181.49">15156 12675 0,'0'0'0,"24"0"0,26 50 16,0-1-16,-1-24 0,26 25 16,-26-1-1,26-24-15,-1 50 16,-24-75-16,49 49 16,-74-49-16,24 25 15,1 0-15,-25-25 16,0 0-16,-1 0 15</inkml:trace>
-  <inkml:trace contextRef="#ctx0" brushRef="#br0" timeOffset="78552">15875 12502 0,'-50'0'31,"50"49"-31,-49 26 0,49 49 16,-50-50-16,-24 0 16,74-24-16,-25 0 15,25-1-15,-25 1 16,0-1 0,25 1-16,-24-50 15,24 25-15,0 0 78,0-75-62</inkml:trace>
-  <inkml:trace contextRef="#ctx0" brushRef="#br0" timeOffset="79294.07">16247 12229 0,'0'0'0,"25"-25"0,0 25 15,24-50 1,-24 50-16,25-25 16,-1 25-16,-24 0 15,0 0-15,0 0 16,0 0-1,-1 25 1,-24 0-16,0 0 16,0 25-16,0 24 15,0-24 1,0-1-16,0-24 16,0 0-16,0 0 15,0-1 63,25 1-78,0 0 16,74 49-16,-49-49 16,-1 25-16,-24-25 15,25 24-15,-50-24 16,0 49-16,0-24 31,0-25-31,0 0 16,0-1-16,-25-24 15,0 0-15,0 0 16,1 0-16,-26 0 31,25 0-31,0 0 16,1-24-16,-1 24 15,-25-50-15,25 50 16,25-25 0,-24 0-16,-1 1 15</inkml:trace>
-  <inkml:trace contextRef="#ctx0" brushRef="#br0" timeOffset="80150">17735 12005 0,'25'0'15,"-25"50"1,50 24 0,-50 51-16,49-51 15,-49 0-15,25 1 16,0-1-16,-25-24 15,25-1-15,0 1 16,-25-25-16,0-50 109,24 0-93,1-24 0,25 24-16,-1-25 15,1 1-15,-25 24 0,0 0 16,-1 25 0,1 0-1,0 0 32,0 0-31,-25 50-16,0-1 15,0-24-15,0 0 16,0 49-16,0-49 16,-50 0-16,25-25 15,-24 0-15,-1 0 31,25 0-31,1 0 16,-1-25 0</inkml:trace>
-  <inkml:trace contextRef="#ctx0" brushRef="#br0" timeOffset="80813.77">18529 12303 0,'25'0'15,"-25"25"1,0 0-16,25-25 15,-25 25 1,0-1-16,25 26 16,-25-25-16,49 0 15,-24 24-15,0-49 16,0 0 15,-1 0-15,1-25-1,-25-24 1,0-26-16,25 26 16,-25-1-16,0 25 15,0-24-15,0 24 16,0 0-16,0 0 16,25 25-16,-25 50 78,25 0-63,24 24-15,-49-49 16,0 49-16,25-24 16,0-1-16,-25-24 15,25 25-15,-1-25 16,-24-1-16</inkml:trace>
-  <inkml:trace contextRef="#ctx0" brushRef="#br0" timeOffset="81602.67">19298 12378 0,'0'-25'31,"0"0"1,0 0-17,-25 25 32,0 0-47,1 0 31,-1 0-31,25 25 0,0 74 16,0-49-16,0-25 16,0 24-1,0-24-15,0 0 16,0 0-16,0-1 16,25-24-1,24 0 1,-24 0-16,0 0 15,24 0 1,-49-24 0,25-1-16,-25 0 15,0 0-15,0 0 16,0 1-16,0-1 16,0-25-16,0 1 15,0 24-15,0 0 16</inkml:trace>
-  <inkml:trace contextRef="#ctx0" brushRef="#br0" timeOffset="82104.99">20092 12254 0,'-25'0'47,"0"0"-32,0 0 1,1 24 0,-1 1-16,25 0 15,0 25 1,0-26-16,0 26 16,0-25-16,0 24 15,25-24-15,-1 0 16,1 0-16,0-25 15,25 49-15,-26-49 16,26 0-16,-25 0 16,0 0-16,-25-24 47,0-1-32,0 0 1,0-25-16</inkml:trace>
-  <inkml:trace contextRef="#ctx0" brushRef="#br0" timeOffset="82428.06">19546 12005 0,'25'25'32,"-25"0"-32,0 0 15,0 0 1,0-1-1,0 1 1,0 0-16,-25 0 16,-25-25-1,1 0 1</inkml:trace>
-  <inkml:trace contextRef="#ctx0" brushRef="#br0" timeOffset="82705.88">19075 11956 0,'0'25'47,"0"-1"-47,0 1 0,0 0 16,0 25-1,-75-26-15,26-24 16,-26 0-16,-24 0 16,0 0-16,0 0 15</inkml:trace>
-  <inkml:trace contextRef="#ctx0" brushRef="#br0" timeOffset="82970.64">18554 11807 0,'0'0'0,"25"-25"15,49-49 1,-24 74-16,-1-75 15,1 51-15,-25-1 16,0 0-16,-1 0 16,26 25-1,-50-25 1</inkml:trace>
-  <inkml:trace contextRef="#ctx0" brushRef="#br0" timeOffset="104920.45">6722 3671 0,'25'0'94,"0"0"-63,49 25-15,-49-25-16,74 0 16,0 0-16,1 25 15,-26-25-15,0 0 0,75 0 16,0 0-1,0 0-15,0 0 16,24 0-16,-24 0 16,0 0-16,-25 0 15,0 0-15,25 0 16,-50 0-16,-25 0 16,51 0-16,-76 0 15,26 0-15,-1 0 16,0 0-1,-24 0-15,24 0 16,1 0-16,-1 0 16,1 0-16,-26 0 0,1 0 15,49 0-15,-25 0 16,1 0 0,-1 0-16,26 0 15,-26 0-15,25 0 16,0 0-16,1 0 15,-1-25-15,-25 0 16,25 25-16,-24 0 16,-1 0-16,25 0 15,-24 0-15,-25 0 16,49 0 0,-50 0-16,1 0 0,-25 0 15,0 0-15,49 0 16,-24 0-16,-26 0 15,1 0-15,0 0 16,0 0 0,49 0-16,-49 0 15,25 0-15,-26 0 16,26 0-16,0 0 16,-26 0-16,1 0 0,0 0 15,0 0 1,0 0-1,-1 0 1,1 0 0,0 0-16,0 0 15,0 0-15,24 0 16,1 0 0,-25 0-16,0 0 15,24 25 1,1-25-16,-1 0 15,1 0-15,0 0 0,-1 25 16,1-25 0,-1 0-16,-24 25 0,0-25 15,49 0 1,1 24-16,-50-24 16,49 0-16,-24 25 15,-1-25-15,51 25 16,-76-25-16,76 0 15,-76 0-15,100 50 16,-74-50-16,0 0 16,49 0-16,0 0 15,-49 0-15,24 0 16,50 0 0,-74 0-16,24 0 0,25 0 15,-49 0-15,0 0 16,49 0-16,-74 0 15,49 0 1,-24 0-16,49 0 16,-25 0-16,25 0 15,-24 0-15,24 0 16,-25 0-16,-24 0 0,24-25 16,-24 25-1,25 0-15,-26 0 16,-24 0-16,0-25 15,24 25-15,-24 0 16,-25-25 0,0 0 390,-25 1-375,25-1 0,-24 25-15</inkml:trace>
-</inkml:ink>
-</file>
-
-<file path=ppt/ink/ink2.xml><?xml version="1.0" encoding="utf-8"?>
-<inkml:ink xmlns:inkml="http://www.w3.org/2003/InkML">
-  <inkml:definitions>
-    <inkml:context xml:id="ctx0">
-      <inkml:inkSource xml:id="inkSrc0">
-        <inkml:traceFormat>
-          <inkml:channel name="X" type="integer" max="1366" units="cm"/>
-          <inkml:channel name="Y" type="integer" max="768" units="cm"/>
-          <inkml:channel name="T" type="integer" max="2.14748E9" units="dev"/>
-        </inkml:traceFormat>
-        <inkml:channelProperties>
-          <inkml:channelProperty channel="X" name="resolution" value="39.7093" units="1/cm"/>
-          <inkml:channelProperty channel="Y" name="resolution" value="39.58763" units="1/cm"/>
-          <inkml:channelProperty channel="T" name="resolution" value="1" units="1/dev"/>
-        </inkml:channelProperties>
-      </inkml:inkSource>
-      <inkml:timestamp xml:id="ts0" timeString="2022-03-10T14:56:44.046"/>
-    </inkml:context>
-    <inkml:brush xml:id="br0">
-      <inkml:brushProperty name="width" value="0.05292" units="cm"/>
-      <inkml:brushProperty name="height" value="0.05292" units="cm"/>
-      <inkml:brushProperty name="color" value="#FF0000"/>
-    </inkml:brush>
-  </inkml:definitions>
-  <inkml:trace contextRef="#ctx0" brushRef="#br0">2530 6325 0,'0'25'188,"25"0"-172,24-25-1,-24 25-15,50-25 16,-26 24-16,1 1 15,0-25-15,-1 25 16,-24-25-16,49 0 16,-49 0-16,50 0 15,-51 0-15,1 25 16,50 0-16,-51-1 16,26-24-16,-25 0 15,0 0-15,-1 0 16,1 0-16,50 0 15,-51 0-15,26 0 16,-25 0-16,49 0 16,-24 0-1,0 0-15,-1 0 16,26 0-16,24 0 16,0 0-16,0-24 15,-74 24-15,74 0 16,-49 0-16,-1 0 15,-24 0-15,0 0 16,25 0-16,-26 0 16,1 0-1,0 0-15,0 0 16,0 0-16,-1 24 16,26 1-16,-25-25 15,0 25-15,-1 0 16,1 0 15,-25-1-31,25 1 16,-25 0-1,0 0 17,0 0 77,0-50 16,0 0-109,25-25-1,-25 26-15,74-51 16,1 1-16,-50 49 15,74-25-15,-25 26 16,25-1-16,1 0 16,-51-25-16,-24 26 15,0 24-15,0 0 16,24 0-16,-24 0 16,0 0-16,0 0 15,-1 0 16,1 0-15,50 0-16,-51 0 16,1 0-16,25 0 15,-25 0 1,49 0-16,25 0 16,-74 0-16,25 0 15,24-25-15,-49 25 16,49 0-16,-24 0 15,0-25-15,-1 25 16,1 0-16,-25 0 16,-1 0-1,1 0-15,0 0 32,0 0-32</inkml:trace>
-  <inkml:trace contextRef="#ctx0" brushRef="#br0" timeOffset="5442.35">2332 6251 0,'-25'0'47,"0"0"-47,-25 25 16,26-1-1,-26 51 1,25-50-16,-49 74 0,49-74 16,-74 99-16,49-50 15,1 0-15,-1 26 16,0 24-16,1-25 15,24-25 1,0-24-16,0 0 16,25 24-16,-25 0 15,25 1-15,0-26 0,0 26 16,0 24-16,0 0 16,0-24-1,0 24-15,0 0 16,25 0-16,25-49 15,-50 24-15,25-49 16,0 0-16</inkml:trace>
-  <inkml:trace contextRef="#ctx0" brushRef="#br0" timeOffset="6749.9">1761 6300 0,'50'0'47,"-25"0"-16,-1 0-31,1 0 16,0 0-1,0 0 1,0 0-1,24 0 1,-24 0 0,0 0-16,0-24 15,-1 24 1,1 0-16,0-25 16,0 25-16,0 0 15,-1 0-15,1 0 16,0 0-16,0-25 15,0 25 1,-25 25 140,0 24-156,0 1 16,0-25 0,0 0-16,0-1 15,0 1-15,0 0 16,0 0-1,0 0 17,0-1 77,24 51-93</inkml:trace>
-  <inkml:trace contextRef="#ctx0" brushRef="#br0" timeOffset="14475.05">3572 7590 0,'0'50'94</inkml:trace>
-  <inkml:trace contextRef="#ctx0" brushRef="#br0" timeOffset="14663.03">3597 8235 0,'0'0'15,"24"99"1,1-74-16,-25 25 16,0-1-1,0-24-15,0 0 16,0 25-16,0-26 16</inkml:trace>
-  <inkml:trace contextRef="#ctx0" brushRef="#br0" timeOffset="14824.01">3671 8930 0,'0'0'0,"0"49"16,0-24-16,0 25 15,0-25-15,0-1 16</inkml:trace>
-  <inkml:trace contextRef="#ctx0" brushRef="#br0" timeOffset="15163.23">3770 9674 0,'0'0'0,"0"49"15,0 1-15,0-25 16,0 24 0,0-24-16,0 0 15,0 0-15,0 24 16,0 1-16,0 0 16,0-25-16,0 24 15,0 1-15,0 24 16,0-24-16,0 24 15,0-24-15,0-1 16,0 75 0,0-99-16,0 25 15,0-25-15,0 24 16,0-24-16,0 0 0</inkml:trace>
-  <inkml:trace contextRef="#ctx0" brushRef="#br0" timeOffset="15318.33">3770 11038 0,'0'25'0,"0"99"32,0-99-32,25 74 0,-25-74 15,0 0-15</inkml:trace>
-  <inkml:trace contextRef="#ctx0" brushRef="#br0" timeOffset="15500.3">3795 11708 0,'0'0'0,"0"49"31,0 1-31,0-25 15,0 24-15,0 1 16,0 0-16,0-1 16,-25 26-16</inkml:trace>
-  <inkml:trace contextRef="#ctx0" brushRef="#br0" timeOffset="16448.75">3547 13891 0,'-25'-25'47,"0"25"-15,1 0-17,-1 0 1,0 0-1,0 25-15,25-1 16,0 1-16,0 0 16,-25 25-16,25-26 15,0 1-15,0 0 16,0 49-16,0-49 16,25 0-1,0-25 16,49 0-31,-49 0 16,0 0 0,0 0-1,0 0-15,-1 0 0,1 0 16,0-74 0,25 24-16,-50 0 15,0 26-15,0-51 16,0 50-16,0-24 15,0 24-15,0 0 16,0 50 62,0 25-62,0-1-16,0-24 15,0 25 1,0-26 47,25-24-48,-1 0 1</inkml:trace>
-  <inkml:trace contextRef="#ctx0" brushRef="#br0" timeOffset="16716.24">4266 14039 0,'25'0'15,"0"0"1,0 0 0,24 0-1,-24 0-15,0 0 16,0 0-16,24 0 15</inkml:trace>
-  <inkml:trace contextRef="#ctx0" brushRef="#br0" timeOffset="16883.25">4762 14039 0,'25'0'0,"-50"0"0,100 0 16,-50 0-1,0 0 1,-1 0-16,26 0 16,24 0-16,1 0 15</inkml:trace>
-  <inkml:trace contextRef="#ctx0" brushRef="#br0" timeOffset="17024.16">5259 14039 0,'49'0'47,"-24"0"-47,49 0 15,1 0-15</inkml:trace>
-  <inkml:trace contextRef="#ctx0" brushRef="#br0" timeOffset="17183.21">6102 14039 0,'0'0'0,"25"0"78</inkml:trace>
-  <inkml:trace contextRef="#ctx0" brushRef="#br0" timeOffset="26130.93">3770 13816 0,'25'0'0,"-25"25"32,25 0 14,-25 0-14,0-1-17,0 1 1,0 0-16,0 0 16,0 0-1,25-1 1,-25 26 15,0-25-15,25 0 15,-25-1-31,0 1 16,24 0-1,-24 0 1,25 0 15,0-1 63,0-24-79,0 0 1,-1 25 0,1-25-1,0 0 1,0 0 15,0 0-15,-1 0-1,1 0 1</inkml:trace>
-</inkml:ink>
-</file>
-
-<file path=ppt/ink/ink3.xml><?xml version="1.0" encoding="utf-8"?>
-<inkml:ink xmlns:inkml="http://www.w3.org/2003/InkML">
-  <inkml:definitions>
-    <inkml:context xml:id="ctx0">
-      <inkml:inkSource xml:id="inkSrc0">
-        <inkml:traceFormat>
-          <inkml:channel name="X" type="integer" max="1366" units="cm"/>
-          <inkml:channel name="Y" type="integer" max="768" units="cm"/>
-          <inkml:channel name="T" type="integer" max="2.14748E9" units="dev"/>
-        </inkml:traceFormat>
-        <inkml:channelProperties>
-          <inkml:channelProperty channel="X" name="resolution" value="39.7093" units="1/cm"/>
-          <inkml:channelProperty channel="Y" name="resolution" value="39.58763" units="1/cm"/>
-          <inkml:channelProperty channel="T" name="resolution" value="1" units="1/dev"/>
-        </inkml:channelProperties>
-      </inkml:inkSource>
-      <inkml:timestamp xml:id="ts0" timeString="2022-03-10T15:03:57.931"/>
-    </inkml:context>
-    <inkml:brush xml:id="br0">
-      <inkml:brushProperty name="width" value="0.05292" units="cm"/>
-      <inkml:brushProperty name="height" value="0.05292" units="cm"/>
-      <inkml:brushProperty name="color" value="#FF0000"/>
-    </inkml:brush>
-  </inkml:definitions>
-  <inkml:trace contextRef="#ctx0" brushRef="#br0">6127 6226 0,'0'-25'15,"25"25"48,-1 25-47,1-25-16,-25 25 15,25-25-15,0 25 16,0-1-1,-1-24-15,1 50 16,0-50-16,0 25 16,0-25-16,-1 25 15,1-25-15,0 0 16,0 0 0,0 0-1,-1 0 1,1 0-16,0 0 31,0 0-15,0 0-16,-1 0 15,1 0 1,0 0-16,0 0 16,0 0-1,-1 0-15,1 0 16,25 24 15,-25-24-31,0 25 16,-1 0-1,1 0 17,0 0-1,0-25 156,0-25-171,-1 25 0,-24-25-1,25 25 16,0 0 1,0 0-17,0 0-15,-1 0 32,1 0-32,0 0 15,0 0 1,0 0-16,-1 0 31,1 0-31,0 0 16,0 0-16,0 0 15,-1 0 1,1 0 0,0 0 15,-25-25-16,25 25-15</inkml:trace>
-  <inkml:trace contextRef="#ctx0" brushRef="#br0" timeOffset="13813.86">11485 6400 0,'24'0'63,"1"24"-48,0-24 1,-25 25-16,25-25 16,0 25-1,-1-25-15,1 25 31,25-25-15,-25 0 0,-25 25-1,24-25-15,1 0 16,0 0-16,0 0 16,0 0-16,24 0 15,-24 0-15,0 0 16,24 0-16,-24 0 15,25 0 1,-25 0-16,24 0 16,1 0-16,-25 0 15,0 0-15,-1 0 0,1 0 16,0 0 0,0 0-16,0 0 15,-1 24 1,1-24 46,0 25-46,0 0-16,0 0 16,-1 0-1,1 24 1,0-49-16,-25 25 15,25 0 1,-25 0 0,25-25 234,-1 0-235,76-50-15,-51 50 16,1-25 0,-1 25-16,1 0 15,24-25-15,-24 1 16,-25 24-16,24-25 15,-24 25-15,50 0 16,-50 0-16,-1 0 16,1 0-16,0 0 15,0 0 17,0 0-32,-1 0 31,1 0-16,0 0 1,0 0 0,24 0-1,-24 0-15,0 0 16,0 0-16,24 0 16,1 0-16,-25 0 15,0 0 1,-1 0-16,26-50 15,-25 25-15,0 25 16,-25-24-16,24 24 16,-24-25-16,0 0 15,0 0 32</inkml:trace>
-  <inkml:trace contextRef="#ctx0" brushRef="#br0" timeOffset="17353.86">4688 6672 0,'0'50'78,"0"0"-63,0-1-15,0 1 16,0 24-16,0-24 16,0 24-16,0 26 15,0-51-15,0 26 16,0-26-16,0 26 15,0-26-15,0 1 16,0 24 0,0-24-16,0-25 0,0-1 15,0 1-15,0 0 16,0 0 0</inkml:trace>
-  <inkml:trace contextRef="#ctx0" brushRef="#br0" timeOffset="18121.58">4415 7516 0,'0'-25'16,"25"25"15,0 0-31,0 25 0,-25 0 16,24-1-1,1 1 1,25 25-16,-50-25 15,25-1-15,-1 1 16,-24 0 0,25-25 31,0 0-16,0 0 0,24 0-15,-24 0 15,0 0-15,0-25-16,0 0 15,24-24-15,-24 24 16,0 0-16,25 0 15,-1-24 1,-49 24-16,25 25 16,0-25-1,0 0 95</inkml:trace>
-  <inkml:trace contextRef="#ctx0" brushRef="#br0" timeOffset="25701.05">5556 9103 0,'0'25'110,"25"-25"-95,-25 25 1,25-25 0,0 25-16,-1-25 15,1 25 1,0-25-1,0 0 1,0 0-16,-25 24 16,24-24-16,1 0 15,0 0 1,0 0-16,0 0 16,0 0-1,-1 0-15,1 0 16,0 0-1,0 0 17,0 0 46,-1 0-63,1 25 17,0-25-1,-25 25-15,0 0 46,0 0-46,25-1 15,-25 1-31,25 0 47,-25 0 0,24-25 62,1-25-109,-25 0 16,25 0-16,-25 1 15,25-1 1,0 25-16,-25-25 16,0 0-1,24 25 32,-24-25-16,25 25-15,0-24 15,0 24 0,0 0-15,-1-25 0,1 25 15,0 0-15,0 0 46,0 0 32,-25-25-63,24 0-15</inkml:trace>
-  <inkml:trace contextRef="#ctx0" brushRef="#br0" timeOffset="29515.26">6995 9128 0,'25'0'94,"0"0"-63,-1 0-16,1 0 1,0 0 0,-25 25-16,25-25 15,0 0-15,-1 0 16,1 0-16,25 0 16,-25 25-1,-1-25 1,1 0-1,0 0 1,0 0-16,0 0 16,-1 0-1,1 0 1,0 0 31,0 25-16,0-25-31,-1 24 31,1 1-15,0 0 15,0 0 0,0 0-31,-25-1 47,24-24 172,1 0-203,0 0-1,0-24-15,24-26 32,-24 50-32,0-25 15,0 0 1,0 25 93,-1 0-93,1 0-16,0 0 31,0 0-15,0 0-1,0 0 1,-1 0-16,1 0 16,0 0-1,0 0 16,0 0-15,-1 0 0,1 0 46</inkml:trace>
-  <inkml:trace contextRef="#ctx0" brushRef="#br0" timeOffset="52629.21">14039 9153 0,'25'0'31,"0"0"1,0 0-1,0 0-31,-1 0 31,1 0-15,0 0-1,25 0-15,-26 0 16,1 0-16,0 0 16,0 0-16,0 0 15,24 0-15,1 0 16,0 0 0,-1 0-16,-24 0 15,0 0-15,0 0 16,24 0-16,-24 0 15,0 0-15,0 0 16,-1 0 0,1 0-16,0 0 15,0 0 1,0 0-16,24 0 16,-24 0-1,25 0-15,-1 0 16,-24 0-1,0 0-15,0 0 16,-1 0 0,1 0-16,-25 25 15,25-25 1,-25 25-16,25-1 16,0 26-1,-25-25 1,24 0-1,1-1 1,0-24 187,0 0-203,0 0 16,24-49-1,1 49-15,49-25 16,-49 25-16,-1-25 16,1 0-1,24 1-15,1 24 16,-50-25-16,24 25 16,-24 0-16,0 0 31,0 0-16,24 0 1,-24 0 0,0 0-1,0 0 1,-1 0-16,1 0 16,0 25-16,25-25 15,-26 0-15,1 0 31,0 0-31,0 0 16,0 0 78</inkml:trace>
-  <inkml:trace contextRef="#ctx0" brushRef="#br0" timeOffset="59208.05">4762 9426 0,'0'25'125,"0"24"-109,0 1-16,0-25 15,0 24-15,0 1 16,0-1-16,0 1 16,0 0-16,0-26 15,0 1 1,0 0-16,0 0 15,0 0-15,0 24 16,0-24-16,0 0 16,0 0-16,0 0 15,0-1-15,0 1 16,0 25-16,0-25 16,0 24-16,0-24 15,0 0-15,0 0 31</inkml:trace>
-  <inkml:trace contextRef="#ctx0" brushRef="#br0" timeOffset="60340.92">4564 10195 0,'25'0'203,"24"25"-203,-24-1 16,0 1-1,0-25-15,0 25 0,49 25 16,-49-26-16,0-24 16,-25 25-1,49-25 220,-24-25-235,0 1 15,25-1 1,-26 0-16,1-25 16,-25 26-16,25-1 15,0 0-15,0 0 31</inkml:trace>
-  <inkml:trace contextRef="#ctx0" brushRef="#br0" timeOffset="78558.99">7069 11832 0,'25'0'140,"0"0"-108,0 25-17,0-25 1,-1 0-16,1 0 15,0 0 17,0 24 46,0-24-78,-1 0 15,1 0 1,0 0-16,0 25 16,24-25-1,-24 0 1,0 25 0,0-25 30,0 25-30,-1 24 31,-24-24-47,25-25 16,-25 25-1,0 0 1,25 0 15,0-25-15,0 0 171,-1-25-171,-24-25-1,25 25-15,25 1 16,-25-1 0,-25 0-16,24 0 15,1 25 95,0 0-95,25 0-15,-26 0 32,26 0-32,-25 0 15,25 0-15,-26 0 31,1 0-15,0 0 0,0 0 15,0 0 0,-1 0 0,1 0 48</inkml:trace>
-  <inkml:trace contextRef="#ctx0" brushRef="#br0" timeOffset="84134.23">8632 11981 0,'25'0'0,"0"0"16,-1 0 31,1 0-32,0 0 16,0 0 16,0 0-31,-1 0-16,26 0 0,-25 0 16,24 0-16,-24 0 15,0 0 1,0 0-16,0 0 31,-25 24 110,25-24-141,24 25 15,-24 0 1,0 0 15,0-25-31,-25 25 16,24-25-16,-24 24 31,25-24 0,-25 25-15,50-25 140,-50-25-140,49 25-1,-49-24-15,25-1 16,0 25 0,-25-25-16,25 25 15,-25-25-15,25 25 94,-1 0-78,1 0 15,0 0-15,0 0-1,0 0 1,-1 0-16,1 0 15,0 0 1,0 0 31,0-25-16,-1 25 32,1 0-63,-25-24 15,0-1-15,25 25 47,-25-25-31,25 25-1</inkml:trace>
-  <inkml:trace contextRef="#ctx0" brushRef="#br0" timeOffset="86091.26">10492 12179 0,'0'25'156,"25"-25"-156,25 0 16,24 0-1,-49 0-15,25 0 16,-26 0 0,51 0-16,-26 0 15,1 0-15,-25 0 16,0 0-16,-1 0 0,1 0 16,0 0 46,0 0-31,0 0-31,-1 0 47,1 0-31,0 25-1,0-25 95,0 25-63,0-1-32,-1-24 1,1 25 15,0-25-31,25 0 281,-26-25-265,26 1 0,-25 24-1,24 0 1,-24 0 171,0-25-171,0 25 0,24 0 93</inkml:trace>
-  <inkml:trace contextRef="#ctx0" brushRef="#br0" timeOffset="89545.8">12824 12030 0,'25'0'78,"0"0"-47,-1 0-15,1 0-1,0 0 1,0 0-1,0 0-15,-1 0 16,26 0-16,0 0 16,-1 0-16,1 0 15,49 0-15,-74 0 16,49 0-16,1 0 16,-1 0-16,1 0 15,-26 0-15,26 0 16,-1 0-16,-24 0 15,-1 0 1,-24 0-16,49 0 16,-24 0-16,-25 0 15,0 0-15,24 0 16,-24 0-16,25 0 0,-26 0 16,26 0-1,0 0-15,-1 0 16,1 0-16,0 0 15,-26 0-15,1 0 16,25 0-16,-25 0 16,24 0-16,1 0 15,-1 0-15,1 0 16,-25 0-16,0 0 16,49 25-1,-49 0-15,49 24 16,-24-49-16,-50 25 0,25-25 15,74 25-15,-99 0 16,25-25 0,-1 25-1,1 0 17,0-1 14,-25 1-14,0 0-17,0-50 157,25 25-172,25-25 16,24 25-16,-49 0 15,49-24-15,-24 24 16,49-25-16,-49 25 16,24 0-16,25 0 15,-24 0-15,-1-25 16,-24 25 0,49 0-16,-50 0 15,26 0-15,-25 0 0,49 0 16,-50 0-16,1 0 15,-25 0-15,74 0 16,-74 0 0,24 0-16,1 0 15,-25 0-15,74 0 16,-49 0-16,-1 0 16,-24 0-16,25 0 15,-26 0-15,51 0 16,-50 0-16,-1 0 15,26 0-15,0 0 16,-1 0 0,-24-25-1,0 25 17</inkml:trace>
-</inkml:ink>
-</file>
-
 <file path=ppt/notesMasters/notesMaster1.xml><?xml version="1.0" encoding="utf-8"?>
 <p:notesMaster xmlns:a="http://schemas.openxmlformats.org/drawingml/2006/main" xmlns:r="http://schemas.openxmlformats.org/officeDocument/2006/relationships" xmlns:p="http://schemas.openxmlformats.org/presentationml/2006/main">
   <p:cSld>
@@ -364,7 +212,7 @@
           <a:p>
             <a:fld id="{1E2F7DCB-AB28-472D-B55D-56C4A29E2CB9}" type="datetimeFigureOut">
               <a:rPr lang="vi-VN" smtClean="0"/>
-              <a:t>10/03/2022</a:t>
+              <a:t>31/03/2022</a:t>
             </a:fld>
             <a:endParaRPr lang="vi-VN"/>
           </a:p>
@@ -778,7 +626,7 @@
           <a:p>
             <a:fld id="{0E893BE0-5818-4C56-80B2-C6B2A3D08DB0}" type="datetime1">
               <a:rPr lang="vi-VN" smtClean="0"/>
-              <a:t>10/03/2022</a:t>
+              <a:t>31/03/2022</a:t>
             </a:fld>
             <a:endParaRPr lang="vi-VN"/>
           </a:p>
@@ -976,7 +824,7 @@
           <a:p>
             <a:fld id="{D562D591-16C9-4FB3-AC7C-435DD74766DA}" type="datetime1">
               <a:rPr lang="vi-VN" smtClean="0"/>
-              <a:t>10/03/2022</a:t>
+              <a:t>31/03/2022</a:t>
             </a:fld>
             <a:endParaRPr lang="vi-VN"/>
           </a:p>
@@ -1184,7 +1032,7 @@
           <a:p>
             <a:fld id="{DA8F5C81-7FFE-44CC-A642-14856BEFA6EB}" type="datetime1">
               <a:rPr lang="vi-VN" smtClean="0"/>
-              <a:t>10/03/2022</a:t>
+              <a:t>31/03/2022</a:t>
             </a:fld>
             <a:endParaRPr lang="vi-VN"/>
           </a:p>
@@ -1382,7 +1230,7 @@
           <a:p>
             <a:fld id="{A14E1D5D-634F-4B0B-B33F-2AFB8208ED73}" type="datetime1">
               <a:rPr lang="vi-VN" smtClean="0"/>
-              <a:t>10/03/2022</a:t>
+              <a:t>31/03/2022</a:t>
             </a:fld>
             <a:endParaRPr lang="vi-VN"/>
           </a:p>
@@ -1657,7 +1505,7 @@
           <a:p>
             <a:fld id="{0BAB674F-341C-4A8C-8EAC-E1275DAF2A8B}" type="datetime1">
               <a:rPr lang="vi-VN" smtClean="0"/>
-              <a:t>10/03/2022</a:t>
+              <a:t>31/03/2022</a:t>
             </a:fld>
             <a:endParaRPr lang="vi-VN"/>
           </a:p>
@@ -1922,7 +1770,7 @@
           <a:p>
             <a:fld id="{CB08604F-66A7-4CAB-B3A0-1CD24D01F08D}" type="datetime1">
               <a:rPr lang="vi-VN" smtClean="0"/>
-              <a:t>10/03/2022</a:t>
+              <a:t>31/03/2022</a:t>
             </a:fld>
             <a:endParaRPr lang="vi-VN"/>
           </a:p>
@@ -2334,7 +2182,7 @@
           <a:p>
             <a:fld id="{6E48C59F-CA3F-4F5E-94E4-29F402E5AD41}" type="datetime1">
               <a:rPr lang="vi-VN" smtClean="0"/>
-              <a:t>10/03/2022</a:t>
+              <a:t>31/03/2022</a:t>
             </a:fld>
             <a:endParaRPr lang="vi-VN"/>
           </a:p>
@@ -2475,7 +2323,7 @@
           <a:p>
             <a:fld id="{9279F96E-039A-4BEB-9E03-2D99BE632D94}" type="datetime1">
               <a:rPr lang="vi-VN" smtClean="0"/>
-              <a:t>10/03/2022</a:t>
+              <a:t>31/03/2022</a:t>
             </a:fld>
             <a:endParaRPr lang="vi-VN"/>
           </a:p>
@@ -2588,7 +2436,7 @@
           <a:p>
             <a:fld id="{2B3D6CB7-00A7-4090-9B6F-4C0C693DC031}" type="datetime1">
               <a:rPr lang="vi-VN" smtClean="0"/>
-              <a:t>10/03/2022</a:t>
+              <a:t>31/03/2022</a:t>
             </a:fld>
             <a:endParaRPr lang="vi-VN"/>
           </a:p>
@@ -2899,7 +2747,7 @@
           <a:p>
             <a:fld id="{85CC997F-8460-4430-8703-3225973C9770}" type="datetime1">
               <a:rPr lang="vi-VN" smtClean="0"/>
-              <a:t>10/03/2022</a:t>
+              <a:t>31/03/2022</a:t>
             </a:fld>
             <a:endParaRPr lang="vi-VN"/>
           </a:p>
@@ -3187,7 +3035,7 @@
           <a:p>
             <a:fld id="{B8266DDB-6DFA-4DB5-8B1C-D8D6DD00C124}" type="datetime1">
               <a:rPr lang="vi-VN" smtClean="0"/>
-              <a:t>10/03/2022</a:t>
+              <a:t>31/03/2022</a:t>
             </a:fld>
             <a:endParaRPr lang="vi-VN"/>
           </a:p>
@@ -3428,7 +3276,7 @@
           <a:p>
             <a:fld id="{BB73D65A-F946-4F8C-B546-6851D882F5BD}" type="datetime1">
               <a:rPr lang="vi-VN" smtClean="0"/>
-              <a:t>10/03/2022</a:t>
+              <a:t>31/03/2022</a:t>
             </a:fld>
             <a:endParaRPr lang="vi-VN"/>
           </a:p>
@@ -3934,7 +3782,7 @@
           <a:p>
             <a:fld id="{07088C5E-FBC0-4E65-B84B-D831FC4D2934}" type="datetime1">
               <a:rPr lang="vi-VN" smtClean="0"/>
-              <a:t>10/03/2022</a:t>
+              <a:t>31/03/2022</a:t>
             </a:fld>
             <a:endParaRPr lang="vi-VN"/>
           </a:p>
@@ -4104,7 +3952,7 @@
           <a:p>
             <a:fld id="{5C2E37FE-A928-433A-A710-0356F9321346}" type="datetime1">
               <a:rPr lang="vi-VN" smtClean="0"/>
-              <a:t>10/03/2022</a:t>
+              <a:t>31/03/2022</a:t>
             </a:fld>
             <a:endParaRPr lang="vi-VN"/>
           </a:p>
@@ -4293,7 +4141,7 @@
           <a:p>
             <a:fld id="{7CDD1A4C-4E27-4C14-8EA2-4E7EB1AB214B}" type="datetime1">
               <a:rPr lang="vi-VN" smtClean="0"/>
-              <a:t>10/03/2022</a:t>
+              <a:t>31/03/2022</a:t>
             </a:fld>
             <a:endParaRPr lang="vi-VN"/>
           </a:p>
@@ -4446,7 +4294,7 @@
           <a:p>
             <a:fld id="{4B5C4D76-31F1-4BB7-8D20-D2CD949364EE}" type="datetime1">
               <a:rPr lang="vi-VN" smtClean="0"/>
-              <a:t>10/03/2022</a:t>
+              <a:t>31/03/2022</a:t>
             </a:fld>
             <a:endParaRPr lang="vi-VN"/>
           </a:p>
@@ -4654,7 +4502,7 @@
           <a:p>
             <a:fld id="{E3603466-C642-485D-B592-7DA7915B549C}" type="datetime1">
               <a:rPr lang="vi-VN" smtClean="0"/>
-              <a:t>10/03/2022</a:t>
+              <a:t>31/03/2022</a:t>
             </a:fld>
             <a:endParaRPr lang="vi-VN"/>
           </a:p>
@@ -4749,8 +4597,8 @@
           </a:p>
         </p:txBody>
       </p:sp>
-      <mc:AlternateContent xmlns:mc="http://schemas.openxmlformats.org/markup-compatibility/2006">
-        <mc:Choice xmlns:a14="http://schemas.microsoft.com/office/drawing/2010/main" Requires="a14">
+      <mc:AlternateContent xmlns:mc="http://schemas.openxmlformats.org/markup-compatibility/2006" xmlns:a14="http://schemas.microsoft.com/office/drawing/2010/main">
+        <mc:Choice Requires="a14">
           <p:sp>
             <p:nvSpPr>
               <p:cNvPr id="3" name="Chỗ dành sẵn cho Nội dung 2">
@@ -4806,13 +4654,7 @@
                       <a:rPr lang="vi-VN" b="0" i="1" smtClean="0">
                         <a:latin typeface="Cambria Math" panose="02040503050406030204" pitchFamily="18" charset="0"/>
                       </a:rPr>
-                      <m:t>={</m:t>
-                    </m:r>
-                    <m:r>
-                      <a:rPr lang="vi-VN" b="0" i="1" smtClean="0">
-                        <a:latin typeface="Cambria Math" panose="02040503050406030204" pitchFamily="18" charset="0"/>
-                      </a:rPr>
-                      <m:t>2</m:t>
+                      <m:t>={2</m:t>
                     </m:r>
                     <m:r>
                       <a:rPr lang="vi-VN" b="0" i="1" smtClean="0">
@@ -4860,19 +4702,7 @@
                       <a:rPr lang="vi-VN" b="0" i="1" smtClean="0">
                         <a:latin typeface="Cambria Math" panose="02040503050406030204" pitchFamily="18" charset="0"/>
                       </a:rPr>
-                      <m:t>≤</m:t>
-                    </m:r>
-                    <m:r>
-                      <a:rPr lang="vi-VN" b="0" i="1" smtClean="0">
-                        <a:latin typeface="Cambria Math" panose="02040503050406030204" pitchFamily="18" charset="0"/>
-                      </a:rPr>
-                      <m:t>10</m:t>
-                    </m:r>
-                    <m:r>
-                      <a:rPr lang="vi-VN" b="0" i="1" smtClean="0">
-                        <a:latin typeface="Cambria Math" panose="02040503050406030204" pitchFamily="18" charset="0"/>
-                      </a:rPr>
-                      <m:t>}</m:t>
+                      <m:t>≤10}</m:t>
                     </m:r>
                   </m:oMath>
                 </a14:m>
@@ -4924,7 +4754,7 @@
             </p:txBody>
           </p:sp>
         </mc:Choice>
-        <mc:Fallback>
+        <mc:Fallback xmlns="">
           <p:sp>
             <p:nvSpPr>
               <p:cNvPr id="3" name="Chỗ dành sẵn cho Nội dung 2">
@@ -4987,7 +4817,7 @@
           <a:p>
             <a:fld id="{8249A8E0-366F-403C-9574-42874BC49FEA}" type="datetime1">
               <a:rPr lang="vi-VN" smtClean="0"/>
-              <a:t>10/03/2022</a:t>
+              <a:t>31/03/2022</a:t>
             </a:fld>
             <a:endParaRPr lang="vi-VN"/>
           </a:p>
@@ -5193,7 +5023,7 @@
           <a:p>
             <a:fld id="{ACB13DED-18E6-4A64-9C58-F3AD80AC6CCE}" type="datetime1">
               <a:rPr lang="vi-VN" smtClean="0"/>
-              <a:t>10/03/2022</a:t>
+              <a:t>31/03/2022</a:t>
             </a:fld>
             <a:endParaRPr lang="vi-VN"/>
           </a:p>
@@ -5347,7 +5177,7 @@
           <a:p>
             <a:fld id="{3AA3DE53-CB4B-4E48-A5BD-01ACAFF14FAB}" type="datetime1">
               <a:rPr lang="vi-VN" smtClean="0"/>
-              <a:t>10/03/2022</a:t>
+              <a:t>31/03/2022</a:t>
             </a:fld>
             <a:endParaRPr lang="vi-VN"/>
           </a:p>
@@ -5565,7 +5395,7 @@
           <a:p>
             <a:fld id="{F35B31A7-800E-41D4-AD97-BE8529BD97E1}" type="datetime1">
               <a:rPr lang="vi-VN" smtClean="0"/>
-              <a:t>10/03/2022</a:t>
+              <a:t>31/03/2022</a:t>
             </a:fld>
             <a:endParaRPr lang="vi-VN"/>
           </a:p>
@@ -7068,7 +6898,7 @@
           <a:p>
             <a:fld id="{1689DA5B-6E8B-404D-BFF4-B02C76F8ED19}" type="datetime1">
               <a:rPr lang="vi-VN" smtClean="0"/>
-              <a:t>10/03/2022</a:t>
+              <a:t>31/03/2022</a:t>
             </a:fld>
             <a:endParaRPr lang="vi-VN"/>
           </a:p>
@@ -7241,7 +7071,7 @@
           <a:p>
             <a:fld id="{5EAB06E6-06B7-449C-BD82-BA53C126B60B}" type="datetime1">
               <a:rPr lang="vi-VN" smtClean="0"/>
-              <a:t>10/03/2022</a:t>
+              <a:t>31/03/2022</a:t>
             </a:fld>
             <a:endParaRPr lang="vi-VN"/>
           </a:p>
@@ -7439,7 +7269,7 @@
           <a:p>
             <a:fld id="{D00D2D5E-A0FB-47F0-8340-20955D9B8D96}" type="datetime1">
               <a:rPr lang="vi-VN" smtClean="0"/>
-              <a:t>10/03/2022</a:t>
+              <a:t>31/03/2022</a:t>
             </a:fld>
             <a:endParaRPr lang="vi-VN"/>
           </a:p>
@@ -7751,7 +7581,7 @@
           <a:p>
             <a:fld id="{0A5F4F05-1CAA-4991-A1D4-0AE8F64FABEE}" type="datetime1">
               <a:rPr lang="vi-VN" smtClean="0"/>
-              <a:t>10/03/2022</a:t>
+              <a:t>31/03/2022</a:t>
             </a:fld>
             <a:endParaRPr lang="vi-VN"/>
           </a:p>
@@ -7924,7 +7754,7 @@
           <a:p>
             <a:fld id="{D92D7635-49E1-4AAF-8746-E5BC12B38759}" type="datetime1">
               <a:rPr lang="vi-VN" smtClean="0"/>
-              <a:t>10/03/2022</a:t>
+              <a:t>31/03/2022</a:t>
             </a:fld>
             <a:endParaRPr lang="vi-VN"/>
           </a:p>
@@ -7959,57 +7789,6 @@
           </a:p>
         </p:txBody>
       </p:sp>
-      <mc:AlternateContent xmlns:mc="http://schemas.openxmlformats.org/markup-compatibility/2006">
-        <mc:Choice xmlns:p14="http://schemas.microsoft.com/office/powerpoint/2010/main" Requires="p14">
-          <p:contentPart p14:bwMode="auto" r:id="rId2">
-            <p14:nvContentPartPr>
-              <p14:cNvPr id="6" name="Viết tay 5">
-                <a:extLst>
-                  <a:ext uri="{FF2B5EF4-FFF2-40B4-BE49-F238E27FC236}">
-                    <a16:creationId xmlns:a16="http://schemas.microsoft.com/office/drawing/2014/main" id="{0A6FEDF1-FAAE-4D77-AD6A-59572750A320}"/>
-                  </a:ext>
-                </a:extLst>
-              </p14:cNvPr>
-              <p14:cNvContentPartPr/>
-              <p14:nvPr/>
-            </p14:nvContentPartPr>
-            <p14:xfrm>
-              <a:off x="1794960" y="1321560"/>
-              <a:ext cx="7563600" cy="3492000"/>
-            </p14:xfrm>
-          </p:contentPart>
-        </mc:Choice>
-        <mc:Fallback>
-          <p:pic>
-            <p:nvPicPr>
-              <p:cNvPr id="6" name="Viết tay 5">
-                <a:extLst>
-                  <a:ext uri="{FF2B5EF4-FFF2-40B4-BE49-F238E27FC236}">
-                    <a16:creationId xmlns:a16="http://schemas.microsoft.com/office/drawing/2014/main" id="{0A6FEDF1-FAAE-4D77-AD6A-59572750A320}"/>
-                  </a:ext>
-                </a:extLst>
-              </p:cNvPr>
-              <p:cNvPicPr/>
-              <p:nvPr/>
-            </p:nvPicPr>
-            <p:blipFill>
-              <a:blip r:embed="rId3"/>
-              <a:stretch>
-                <a:fillRect/>
-              </a:stretch>
-            </p:blipFill>
-            <p:spPr>
-              <a:xfrm>
-                <a:off x="1785600" y="1312200"/>
-                <a:ext cx="7582320" cy="3510720"/>
-              </a:xfrm>
-              <a:prstGeom prst="rect">
-                <a:avLst/>
-              </a:prstGeom>
-            </p:spPr>
-          </p:pic>
-        </mc:Fallback>
-      </mc:AlternateContent>
     </p:spTree>
     <p:extLst>
       <p:ext uri="{BB962C8B-B14F-4D97-AF65-F5344CB8AC3E}">
@@ -8248,7 +8027,7 @@
           <a:p>
             <a:fld id="{4A106F89-B2B3-4DA1-9563-0F3990E5EF99}" type="datetime1">
               <a:rPr lang="vi-VN" smtClean="0"/>
-              <a:t>10/03/2022</a:t>
+              <a:t>31/03/2022</a:t>
             </a:fld>
             <a:endParaRPr lang="vi-VN"/>
           </a:p>
@@ -8283,57 +8062,6 @@
           </a:p>
         </p:txBody>
       </p:sp>
-      <mc:AlternateContent xmlns:mc="http://schemas.openxmlformats.org/markup-compatibility/2006">
-        <mc:Choice xmlns:p14="http://schemas.microsoft.com/office/powerpoint/2010/main" Requires="p14">
-          <p:contentPart p14:bwMode="auto" r:id="rId2">
-            <p14:nvContentPartPr>
-              <p14:cNvPr id="11" name="Viết tay 10">
-                <a:extLst>
-                  <a:ext uri="{FF2B5EF4-FFF2-40B4-BE49-F238E27FC236}">
-                    <a16:creationId xmlns:a16="http://schemas.microsoft.com/office/drawing/2014/main" id="{BBD2C66C-F8B4-4D9D-B8EB-C064C9297FDF}"/>
-                  </a:ext>
-                </a:extLst>
-              </p14:cNvPr>
-              <p14:cNvContentPartPr/>
-              <p14:nvPr/>
-            </p14:nvContentPartPr>
-            <p14:xfrm>
-              <a:off x="571320" y="2241360"/>
-              <a:ext cx="1813320" cy="2911320"/>
-            </p14:xfrm>
-          </p:contentPart>
-        </mc:Choice>
-        <mc:Fallback>
-          <p:pic>
-            <p:nvPicPr>
-              <p:cNvPr id="11" name="Viết tay 10">
-                <a:extLst>
-                  <a:ext uri="{FF2B5EF4-FFF2-40B4-BE49-F238E27FC236}">
-                    <a16:creationId xmlns:a16="http://schemas.microsoft.com/office/drawing/2014/main" id="{BBD2C66C-F8B4-4D9D-B8EB-C064C9297FDF}"/>
-                  </a:ext>
-                </a:extLst>
-              </p:cNvPr>
-              <p:cNvPicPr/>
-              <p:nvPr/>
-            </p:nvPicPr>
-            <p:blipFill>
-              <a:blip r:embed="rId3"/>
-              <a:stretch>
-                <a:fillRect/>
-              </a:stretch>
-            </p:blipFill>
-            <p:spPr>
-              <a:xfrm>
-                <a:off x="561960" y="2232000"/>
-                <a:ext cx="1832040" cy="2930040"/>
-              </a:xfrm>
-              <a:prstGeom prst="rect">
-                <a:avLst/>
-              </a:prstGeom>
-            </p:spPr>
-          </p:pic>
-        </mc:Fallback>
-      </mc:AlternateContent>
     </p:spTree>
     <p:extLst>
       <p:ext uri="{BB962C8B-B14F-4D97-AF65-F5344CB8AC3E}">
@@ -8394,8 +8122,8 @@
           </a:p>
         </p:txBody>
       </p:sp>
-      <mc:AlternateContent xmlns:mc="http://schemas.openxmlformats.org/markup-compatibility/2006">
-        <mc:Choice xmlns:a14="http://schemas.microsoft.com/office/drawing/2010/main" Requires="a14">
+      <mc:AlternateContent xmlns:mc="http://schemas.openxmlformats.org/markup-compatibility/2006" xmlns:a14="http://schemas.microsoft.com/office/drawing/2010/main">
+        <mc:Choice Requires="a14">
           <p:sp>
             <p:nvSpPr>
               <p:cNvPr id="3" name="Chỗ dành sẵn cho Nội dung 2">
@@ -8556,7 +8284,7 @@
             </p:txBody>
           </p:sp>
         </mc:Choice>
-        <mc:Fallback>
+        <mc:Fallback xmlns="">
           <p:sp>
             <p:nvSpPr>
               <p:cNvPr id="3" name="Chỗ dành sẵn cho Nội dung 2">
@@ -8853,7 +8581,7 @@
           <a:p>
             <a:fld id="{196D1113-07BF-4D1B-B5E9-5F06886F3C22}" type="datetime1">
               <a:rPr lang="vi-VN" smtClean="0"/>
-              <a:t>10/03/2022</a:t>
+              <a:t>31/03/2022</a:t>
             </a:fld>
             <a:endParaRPr lang="vi-VN"/>
           </a:p>
@@ -8888,57 +8616,6 @@
           </a:p>
         </p:txBody>
       </p:sp>
-      <mc:AlternateContent xmlns:mc="http://schemas.openxmlformats.org/markup-compatibility/2006">
-        <mc:Choice xmlns:p14="http://schemas.microsoft.com/office/powerpoint/2010/main" Requires="p14">
-          <p:contentPart p14:bwMode="auto" r:id="rId3">
-            <p14:nvContentPartPr>
-              <p14:cNvPr id="16" name="Viết tay 15">
-                <a:extLst>
-                  <a:ext uri="{FF2B5EF4-FFF2-40B4-BE49-F238E27FC236}">
-                    <a16:creationId xmlns:a16="http://schemas.microsoft.com/office/drawing/2014/main" id="{EFB9F30F-1AC9-4028-9946-89A656B218FB}"/>
-                  </a:ext>
-                </a:extLst>
-              </p14:cNvPr>
-              <p14:cNvContentPartPr/>
-              <p14:nvPr/>
-            </p14:nvContentPartPr>
-            <p14:xfrm>
-              <a:off x="1589400" y="2232360"/>
-              <a:ext cx="4724280" cy="2206080"/>
-            </p14:xfrm>
-          </p:contentPart>
-        </mc:Choice>
-        <mc:Fallback>
-          <p:pic>
-            <p:nvPicPr>
-              <p:cNvPr id="16" name="Viết tay 15">
-                <a:extLst>
-                  <a:ext uri="{FF2B5EF4-FFF2-40B4-BE49-F238E27FC236}">
-                    <a16:creationId xmlns:a16="http://schemas.microsoft.com/office/drawing/2014/main" id="{EFB9F30F-1AC9-4028-9946-89A656B218FB}"/>
-                  </a:ext>
-                </a:extLst>
-              </p:cNvPr>
-              <p:cNvPicPr/>
-              <p:nvPr/>
-            </p:nvPicPr>
-            <p:blipFill>
-              <a:blip r:embed="rId4"/>
-              <a:stretch>
-                <a:fillRect/>
-              </a:stretch>
-            </p:blipFill>
-            <p:spPr>
-              <a:xfrm>
-                <a:off x="1580040" y="2223000"/>
-                <a:ext cx="4743000" cy="2224800"/>
-              </a:xfrm>
-              <a:prstGeom prst="rect">
-                <a:avLst/>
-              </a:prstGeom>
-            </p:spPr>
-          </p:pic>
-        </mc:Fallback>
-      </mc:AlternateContent>
     </p:spTree>
     <p:extLst>
       <p:ext uri="{BB962C8B-B14F-4D97-AF65-F5344CB8AC3E}">

</xml_diff>